<commit_message>
Adicionando botões no dashboard.
</commit_message>
<xml_diff>
--- a/Template/powerbi_template.pptx
+++ b/Template/powerbi_template.pptx
@@ -8,6 +8,8 @@
     <p:sldId id="257" r:id="rId2"/>
     <p:sldId id="258" r:id="rId3"/>
     <p:sldId id="256" r:id="rId4"/>
+    <p:sldId id="259" r:id="rId5"/>
+    <p:sldId id="260" r:id="rId6"/>
   </p:sldIdLst>
   <p:sldSz cx="12192000" cy="6858000"/>
   <p:notesSz cx="6858000" cy="9144000"/>
@@ -261,7 +263,7 @@
           <a:p>
             <a:fld id="{FA1AB51C-77DB-4F20-A415-65C2B86551F8}" type="datetimeFigureOut">
               <a:rPr lang="pt-BR" smtClean="0"/>
-              <a:t>06/12/2025</a:t>
+              <a:t>07/12/2025</a:t>
             </a:fld>
             <a:endParaRPr lang="pt-BR"/>
           </a:p>
@@ -459,7 +461,7 @@
           <a:p>
             <a:fld id="{FA1AB51C-77DB-4F20-A415-65C2B86551F8}" type="datetimeFigureOut">
               <a:rPr lang="pt-BR" smtClean="0"/>
-              <a:t>06/12/2025</a:t>
+              <a:t>07/12/2025</a:t>
             </a:fld>
             <a:endParaRPr lang="pt-BR"/>
           </a:p>
@@ -667,7 +669,7 @@
           <a:p>
             <a:fld id="{FA1AB51C-77DB-4F20-A415-65C2B86551F8}" type="datetimeFigureOut">
               <a:rPr lang="pt-BR" smtClean="0"/>
-              <a:t>06/12/2025</a:t>
+              <a:t>07/12/2025</a:t>
             </a:fld>
             <a:endParaRPr lang="pt-BR"/>
           </a:p>
@@ -865,7 +867,7 @@
           <a:p>
             <a:fld id="{FA1AB51C-77DB-4F20-A415-65C2B86551F8}" type="datetimeFigureOut">
               <a:rPr lang="pt-BR" smtClean="0"/>
-              <a:t>06/12/2025</a:t>
+              <a:t>07/12/2025</a:t>
             </a:fld>
             <a:endParaRPr lang="pt-BR"/>
           </a:p>
@@ -1140,7 +1142,7 @@
           <a:p>
             <a:fld id="{FA1AB51C-77DB-4F20-A415-65C2B86551F8}" type="datetimeFigureOut">
               <a:rPr lang="pt-BR" smtClean="0"/>
-              <a:t>06/12/2025</a:t>
+              <a:t>07/12/2025</a:t>
             </a:fld>
             <a:endParaRPr lang="pt-BR"/>
           </a:p>
@@ -1405,7 +1407,7 @@
           <a:p>
             <a:fld id="{FA1AB51C-77DB-4F20-A415-65C2B86551F8}" type="datetimeFigureOut">
               <a:rPr lang="pt-BR" smtClean="0"/>
-              <a:t>06/12/2025</a:t>
+              <a:t>07/12/2025</a:t>
             </a:fld>
             <a:endParaRPr lang="pt-BR"/>
           </a:p>
@@ -1817,7 +1819,7 @@
           <a:p>
             <a:fld id="{FA1AB51C-77DB-4F20-A415-65C2B86551F8}" type="datetimeFigureOut">
               <a:rPr lang="pt-BR" smtClean="0"/>
-              <a:t>06/12/2025</a:t>
+              <a:t>07/12/2025</a:t>
             </a:fld>
             <a:endParaRPr lang="pt-BR"/>
           </a:p>
@@ -1958,7 +1960,7 @@
           <a:p>
             <a:fld id="{FA1AB51C-77DB-4F20-A415-65C2B86551F8}" type="datetimeFigureOut">
               <a:rPr lang="pt-BR" smtClean="0"/>
-              <a:t>06/12/2025</a:t>
+              <a:t>07/12/2025</a:t>
             </a:fld>
             <a:endParaRPr lang="pt-BR"/>
           </a:p>
@@ -2071,7 +2073,7 @@
           <a:p>
             <a:fld id="{FA1AB51C-77DB-4F20-A415-65C2B86551F8}" type="datetimeFigureOut">
               <a:rPr lang="pt-BR" smtClean="0"/>
-              <a:t>06/12/2025</a:t>
+              <a:t>07/12/2025</a:t>
             </a:fld>
             <a:endParaRPr lang="pt-BR"/>
           </a:p>
@@ -2382,7 +2384,7 @@
           <a:p>
             <a:fld id="{FA1AB51C-77DB-4F20-A415-65C2B86551F8}" type="datetimeFigureOut">
               <a:rPr lang="pt-BR" smtClean="0"/>
-              <a:t>06/12/2025</a:t>
+              <a:t>07/12/2025</a:t>
             </a:fld>
             <a:endParaRPr lang="pt-BR"/>
           </a:p>
@@ -2670,7 +2672,7 @@
           <a:p>
             <a:fld id="{FA1AB51C-77DB-4F20-A415-65C2B86551F8}" type="datetimeFigureOut">
               <a:rPr lang="pt-BR" smtClean="0"/>
-              <a:t>06/12/2025</a:t>
+              <a:t>07/12/2025</a:t>
             </a:fld>
             <a:endParaRPr lang="pt-BR"/>
           </a:p>
@@ -2911,7 +2913,7 @@
           <a:p>
             <a:fld id="{FA1AB51C-77DB-4F20-A415-65C2B86551F8}" type="datetimeFigureOut">
               <a:rPr lang="pt-BR" smtClean="0"/>
-              <a:t>06/12/2025</a:t>
+              <a:t>07/12/2025</a:t>
             </a:fld>
             <a:endParaRPr lang="pt-BR"/>
           </a:p>
@@ -4552,6 +4554,42 @@
           </a:prstGeom>
         </p:spPr>
       </p:pic>
+      <p:pic>
+        <p:nvPicPr>
+          <p:cNvPr id="3" name="Imagem 2">
+            <a:extLst>
+              <a:ext uri="{FF2B5EF4-FFF2-40B4-BE49-F238E27FC236}">
+                <a16:creationId xmlns:a16="http://schemas.microsoft.com/office/drawing/2014/main" id="{58A02A0F-08CF-4671-9D55-7792F9A27538}"/>
+              </a:ext>
+            </a:extLst>
+          </p:cNvPr>
+          <p:cNvPicPr>
+            <a:picLocks noChangeAspect="1"/>
+          </p:cNvPicPr>
+          <p:nvPr/>
+        </p:nvPicPr>
+        <p:blipFill>
+          <a:blip r:embed="rId3">
+            <a:extLst>
+              <a:ext uri="{28A0092B-C50C-407E-A947-70E740481C1C}">
+                <a14:useLocalDpi xmlns:a14="http://schemas.microsoft.com/office/drawing/2010/main" val="0"/>
+              </a:ext>
+            </a:extLst>
+          </a:blip>
+          <a:stretch>
+            <a:fillRect/>
+          </a:stretch>
+        </p:blipFill>
+        <p:spPr>
+          <a:xfrm>
+            <a:off x="36753" y="-208514"/>
+            <a:ext cx="12155247" cy="7025358"/>
+          </a:xfrm>
+          <a:prstGeom prst="rect">
+            <a:avLst/>
+          </a:prstGeom>
+        </p:spPr>
+      </p:pic>
     </p:spTree>
     <p:extLst>
       <p:ext uri="{BB962C8B-B14F-4D97-AF65-F5344CB8AC3E}">
@@ -5466,6 +5504,1449 @@
     <p:extLst>
       <p:ext uri="{BB962C8B-B14F-4D97-AF65-F5344CB8AC3E}">
         <p14:creationId xmlns:p14="http://schemas.microsoft.com/office/powerpoint/2010/main" val="770914421"/>
+      </p:ext>
+    </p:extLst>
+  </p:cSld>
+  <p:clrMapOvr>
+    <a:masterClrMapping/>
+  </p:clrMapOvr>
+</p:sld>
+</file>
+
+<file path=ppt/slides/slide4.xml><?xml version="1.0" encoding="utf-8"?>
+<p:sld xmlns:a="http://schemas.openxmlformats.org/drawingml/2006/main" xmlns:r="http://schemas.openxmlformats.org/officeDocument/2006/relationships" xmlns:p="http://schemas.openxmlformats.org/presentationml/2006/main">
+  <p:cSld>
+    <p:spTree>
+      <p:nvGrpSpPr>
+        <p:cNvPr id="1" name=""/>
+        <p:cNvGrpSpPr/>
+        <p:nvPr/>
+      </p:nvGrpSpPr>
+      <p:grpSpPr>
+        <a:xfrm>
+          <a:off x="0" y="0"/>
+          <a:ext cx="0" cy="0"/>
+          <a:chOff x="0" y="0"/>
+          <a:chExt cx="0" cy="0"/>
+        </a:xfrm>
+      </p:grpSpPr>
+      <p:sp>
+        <p:nvSpPr>
+          <p:cNvPr id="25" name="Retângulo 24">
+            <a:extLst>
+              <a:ext uri="{FF2B5EF4-FFF2-40B4-BE49-F238E27FC236}">
+                <a16:creationId xmlns:a16="http://schemas.microsoft.com/office/drawing/2014/main" id="{2451BEA7-3C3D-59AE-5D6D-980D159B7C5C}"/>
+              </a:ext>
+            </a:extLst>
+          </p:cNvPr>
+          <p:cNvSpPr/>
+          <p:nvPr/>
+        </p:nvSpPr>
+        <p:spPr>
+          <a:xfrm>
+            <a:off x="0" y="0"/>
+            <a:ext cx="12192000" cy="6858000"/>
+          </a:xfrm>
+          <a:prstGeom prst="rect">
+            <a:avLst/>
+          </a:prstGeom>
+          <a:solidFill>
+            <a:srgbClr val="F3C911"/>
+          </a:solidFill>
+          <a:ln>
+            <a:noFill/>
+          </a:ln>
+        </p:spPr>
+        <p:style>
+          <a:lnRef idx="2">
+            <a:schemeClr val="accent1">
+              <a:shade val="15000"/>
+            </a:schemeClr>
+          </a:lnRef>
+          <a:fillRef idx="1">
+            <a:schemeClr val="accent1"/>
+          </a:fillRef>
+          <a:effectRef idx="0">
+            <a:schemeClr val="accent1"/>
+          </a:effectRef>
+          <a:fontRef idx="minor">
+            <a:schemeClr val="lt1"/>
+          </a:fontRef>
+        </p:style>
+        <p:txBody>
+          <a:bodyPr rtlCol="0" anchor="ctr"/>
+          <a:lstStyle/>
+          <a:p>
+            <a:pPr algn="ctr"/>
+            <a:endParaRPr lang="pt-BR"/>
+          </a:p>
+        </p:txBody>
+      </p:sp>
+      <p:sp>
+        <p:nvSpPr>
+          <p:cNvPr id="26" name="Retângulo: Cantos Superiores Arredondados 25">
+            <a:extLst>
+              <a:ext uri="{FF2B5EF4-FFF2-40B4-BE49-F238E27FC236}">
+                <a16:creationId xmlns:a16="http://schemas.microsoft.com/office/drawing/2014/main" id="{63ACE2F9-DB39-3539-DF96-078203D451E8}"/>
+              </a:ext>
+            </a:extLst>
+          </p:cNvPr>
+          <p:cNvSpPr/>
+          <p:nvPr/>
+        </p:nvSpPr>
+        <p:spPr>
+          <a:xfrm rot="16200000">
+            <a:off x="3726180" y="-1607820"/>
+            <a:ext cx="6858000" cy="10073640"/>
+          </a:xfrm>
+          <a:prstGeom prst="round2SameRect">
+            <a:avLst>
+              <a:gd name="adj1" fmla="val 4371"/>
+              <a:gd name="adj2" fmla="val 0"/>
+            </a:avLst>
+          </a:prstGeom>
+          <a:solidFill>
+            <a:srgbClr val="C4C9CB"/>
+          </a:solidFill>
+          <a:ln>
+            <a:noFill/>
+          </a:ln>
+        </p:spPr>
+        <p:style>
+          <a:lnRef idx="2">
+            <a:schemeClr val="accent1">
+              <a:shade val="15000"/>
+            </a:schemeClr>
+          </a:lnRef>
+          <a:fillRef idx="1">
+            <a:schemeClr val="accent1"/>
+          </a:fillRef>
+          <a:effectRef idx="0">
+            <a:schemeClr val="accent1"/>
+          </a:effectRef>
+          <a:fontRef idx="minor">
+            <a:schemeClr val="lt1"/>
+          </a:fontRef>
+        </p:style>
+        <p:txBody>
+          <a:bodyPr rtlCol="0" anchor="ctr"/>
+          <a:lstStyle/>
+          <a:p>
+            <a:pPr algn="ctr"/>
+            <a:endParaRPr lang="pt-BR"/>
+          </a:p>
+        </p:txBody>
+      </p:sp>
+      <p:sp>
+        <p:nvSpPr>
+          <p:cNvPr id="32" name="Retângulo 31">
+            <a:extLst>
+              <a:ext uri="{FF2B5EF4-FFF2-40B4-BE49-F238E27FC236}">
+                <a16:creationId xmlns:a16="http://schemas.microsoft.com/office/drawing/2014/main" id="{272516B4-A5C0-8EC9-8FA5-2C30A0423BAC}"/>
+              </a:ext>
+            </a:extLst>
+          </p:cNvPr>
+          <p:cNvSpPr/>
+          <p:nvPr/>
+        </p:nvSpPr>
+        <p:spPr>
+          <a:xfrm rot="5400000">
+            <a:off x="7011179" y="-4315259"/>
+            <a:ext cx="288000" cy="9494518"/>
+          </a:xfrm>
+          <a:prstGeom prst="rect">
+            <a:avLst/>
+          </a:prstGeom>
+          <a:solidFill>
+            <a:srgbClr val="F3C911"/>
+          </a:solidFill>
+          <a:ln>
+            <a:noFill/>
+          </a:ln>
+        </p:spPr>
+        <p:style>
+          <a:lnRef idx="2">
+            <a:schemeClr val="accent1">
+              <a:shade val="15000"/>
+            </a:schemeClr>
+          </a:lnRef>
+          <a:fillRef idx="1">
+            <a:schemeClr val="accent1"/>
+          </a:fillRef>
+          <a:effectRef idx="0">
+            <a:schemeClr val="accent1"/>
+          </a:effectRef>
+          <a:fontRef idx="minor">
+            <a:schemeClr val="lt1"/>
+          </a:fontRef>
+        </p:style>
+        <p:txBody>
+          <a:bodyPr rtlCol="0" anchor="ctr"/>
+          <a:lstStyle/>
+          <a:p>
+            <a:pPr algn="ctr"/>
+            <a:endParaRPr lang="pt-BR"/>
+          </a:p>
+        </p:txBody>
+      </p:sp>
+      <p:sp>
+        <p:nvSpPr>
+          <p:cNvPr id="55" name="Retângulo: Cantos Arredondados 54">
+            <a:extLst>
+              <a:ext uri="{FF2B5EF4-FFF2-40B4-BE49-F238E27FC236}">
+                <a16:creationId xmlns:a16="http://schemas.microsoft.com/office/drawing/2014/main" id="{90A31C32-1F8D-88F9-693A-13002C9331AA}"/>
+              </a:ext>
+            </a:extLst>
+          </p:cNvPr>
+          <p:cNvSpPr/>
+          <p:nvPr/>
+        </p:nvSpPr>
+        <p:spPr>
+          <a:xfrm>
+            <a:off x="2407919" y="864000"/>
+            <a:ext cx="2152649" cy="995278"/>
+          </a:xfrm>
+          <a:prstGeom prst="roundRect">
+            <a:avLst>
+              <a:gd name="adj" fmla="val 15646"/>
+            </a:avLst>
+          </a:prstGeom>
+          <a:solidFill>
+            <a:schemeClr val="bg1"/>
+          </a:solidFill>
+          <a:ln>
+            <a:noFill/>
+          </a:ln>
+        </p:spPr>
+        <p:style>
+          <a:lnRef idx="2">
+            <a:schemeClr val="accent1">
+              <a:shade val="15000"/>
+            </a:schemeClr>
+          </a:lnRef>
+          <a:fillRef idx="1">
+            <a:schemeClr val="accent1"/>
+          </a:fillRef>
+          <a:effectRef idx="0">
+            <a:schemeClr val="accent1"/>
+          </a:effectRef>
+          <a:fontRef idx="minor">
+            <a:schemeClr val="lt1"/>
+          </a:fontRef>
+        </p:style>
+        <p:txBody>
+          <a:bodyPr rtlCol="0" anchor="ctr"/>
+          <a:lstStyle/>
+          <a:p>
+            <a:pPr algn="ctr"/>
+            <a:endParaRPr lang="pt-BR"/>
+          </a:p>
+        </p:txBody>
+      </p:sp>
+      <p:sp>
+        <p:nvSpPr>
+          <p:cNvPr id="56" name="Retângulo: Cantos Arredondados 55">
+            <a:extLst>
+              <a:ext uri="{FF2B5EF4-FFF2-40B4-BE49-F238E27FC236}">
+                <a16:creationId xmlns:a16="http://schemas.microsoft.com/office/drawing/2014/main" id="{C1F209E6-B998-2986-9911-B03DF8CD9BB7}"/>
+              </a:ext>
+            </a:extLst>
+          </p:cNvPr>
+          <p:cNvSpPr/>
+          <p:nvPr/>
+        </p:nvSpPr>
+        <p:spPr>
+          <a:xfrm>
+            <a:off x="4855844" y="864000"/>
+            <a:ext cx="2152649" cy="995278"/>
+          </a:xfrm>
+          <a:prstGeom prst="roundRect">
+            <a:avLst>
+              <a:gd name="adj" fmla="val 15646"/>
+            </a:avLst>
+          </a:prstGeom>
+          <a:solidFill>
+            <a:schemeClr val="bg1"/>
+          </a:solidFill>
+          <a:ln>
+            <a:noFill/>
+          </a:ln>
+        </p:spPr>
+        <p:style>
+          <a:lnRef idx="2">
+            <a:schemeClr val="accent1">
+              <a:shade val="15000"/>
+            </a:schemeClr>
+          </a:lnRef>
+          <a:fillRef idx="1">
+            <a:schemeClr val="accent1"/>
+          </a:fillRef>
+          <a:effectRef idx="0">
+            <a:schemeClr val="accent1"/>
+          </a:effectRef>
+          <a:fontRef idx="minor">
+            <a:schemeClr val="lt1"/>
+          </a:fontRef>
+        </p:style>
+        <p:txBody>
+          <a:bodyPr rtlCol="0" anchor="ctr"/>
+          <a:lstStyle/>
+          <a:p>
+            <a:pPr algn="ctr"/>
+            <a:endParaRPr lang="pt-BR"/>
+          </a:p>
+        </p:txBody>
+      </p:sp>
+      <p:sp>
+        <p:nvSpPr>
+          <p:cNvPr id="57" name="Retângulo: Cantos Arredondados 56">
+            <a:extLst>
+              <a:ext uri="{FF2B5EF4-FFF2-40B4-BE49-F238E27FC236}">
+                <a16:creationId xmlns:a16="http://schemas.microsoft.com/office/drawing/2014/main" id="{4A7DDF52-1370-5A43-A7DB-B0D9C77A0445}"/>
+              </a:ext>
+            </a:extLst>
+          </p:cNvPr>
+          <p:cNvSpPr/>
+          <p:nvPr/>
+        </p:nvSpPr>
+        <p:spPr>
+          <a:xfrm>
+            <a:off x="7303768" y="864000"/>
+            <a:ext cx="2152649" cy="995278"/>
+          </a:xfrm>
+          <a:prstGeom prst="roundRect">
+            <a:avLst>
+              <a:gd name="adj" fmla="val 15646"/>
+            </a:avLst>
+          </a:prstGeom>
+          <a:solidFill>
+            <a:schemeClr val="bg1"/>
+          </a:solidFill>
+          <a:ln>
+            <a:noFill/>
+          </a:ln>
+        </p:spPr>
+        <p:style>
+          <a:lnRef idx="2">
+            <a:schemeClr val="accent1">
+              <a:shade val="15000"/>
+            </a:schemeClr>
+          </a:lnRef>
+          <a:fillRef idx="1">
+            <a:schemeClr val="accent1"/>
+          </a:fillRef>
+          <a:effectRef idx="0">
+            <a:schemeClr val="accent1"/>
+          </a:effectRef>
+          <a:fontRef idx="minor">
+            <a:schemeClr val="lt1"/>
+          </a:fontRef>
+        </p:style>
+        <p:txBody>
+          <a:bodyPr rtlCol="0" anchor="ctr"/>
+          <a:lstStyle/>
+          <a:p>
+            <a:pPr algn="ctr"/>
+            <a:endParaRPr lang="pt-BR"/>
+          </a:p>
+        </p:txBody>
+      </p:sp>
+      <p:sp>
+        <p:nvSpPr>
+          <p:cNvPr id="58" name="Retângulo: Cantos Arredondados 57">
+            <a:extLst>
+              <a:ext uri="{FF2B5EF4-FFF2-40B4-BE49-F238E27FC236}">
+                <a16:creationId xmlns:a16="http://schemas.microsoft.com/office/drawing/2014/main" id="{2A1E9EBA-D19A-CC5F-4E62-C242DB8F8B3A}"/>
+              </a:ext>
+            </a:extLst>
+          </p:cNvPr>
+          <p:cNvSpPr/>
+          <p:nvPr/>
+        </p:nvSpPr>
+        <p:spPr>
+          <a:xfrm>
+            <a:off x="9743123" y="864000"/>
+            <a:ext cx="2152649" cy="995278"/>
+          </a:xfrm>
+          <a:prstGeom prst="roundRect">
+            <a:avLst>
+              <a:gd name="adj" fmla="val 15646"/>
+            </a:avLst>
+          </a:prstGeom>
+          <a:solidFill>
+            <a:schemeClr val="bg1"/>
+          </a:solidFill>
+          <a:ln>
+            <a:noFill/>
+          </a:ln>
+        </p:spPr>
+        <p:style>
+          <a:lnRef idx="2">
+            <a:schemeClr val="accent1">
+              <a:shade val="15000"/>
+            </a:schemeClr>
+          </a:lnRef>
+          <a:fillRef idx="1">
+            <a:schemeClr val="accent1"/>
+          </a:fillRef>
+          <a:effectRef idx="0">
+            <a:schemeClr val="accent1"/>
+          </a:effectRef>
+          <a:fontRef idx="minor">
+            <a:schemeClr val="lt1"/>
+          </a:fontRef>
+        </p:style>
+        <p:txBody>
+          <a:bodyPr rtlCol="0" anchor="ctr"/>
+          <a:lstStyle/>
+          <a:p>
+            <a:pPr algn="ctr"/>
+            <a:endParaRPr lang="pt-BR"/>
+          </a:p>
+        </p:txBody>
+      </p:sp>
+      <p:sp>
+        <p:nvSpPr>
+          <p:cNvPr id="59" name="Retângulo: Cantos Arredondados 58">
+            <a:extLst>
+              <a:ext uri="{FF2B5EF4-FFF2-40B4-BE49-F238E27FC236}">
+                <a16:creationId xmlns:a16="http://schemas.microsoft.com/office/drawing/2014/main" id="{C36AB2CF-EAD5-61E8-1ED6-B40981265880}"/>
+              </a:ext>
+            </a:extLst>
+          </p:cNvPr>
+          <p:cNvSpPr/>
+          <p:nvPr/>
+        </p:nvSpPr>
+        <p:spPr>
+          <a:xfrm>
+            <a:off x="2411730" y="2145719"/>
+            <a:ext cx="4594858" cy="2068919"/>
+          </a:xfrm>
+          <a:prstGeom prst="roundRect">
+            <a:avLst>
+              <a:gd name="adj" fmla="val 15646"/>
+            </a:avLst>
+          </a:prstGeom>
+          <a:solidFill>
+            <a:schemeClr val="bg1"/>
+          </a:solidFill>
+          <a:ln>
+            <a:noFill/>
+          </a:ln>
+        </p:spPr>
+        <p:style>
+          <a:lnRef idx="2">
+            <a:schemeClr val="accent1">
+              <a:shade val="15000"/>
+            </a:schemeClr>
+          </a:lnRef>
+          <a:fillRef idx="1">
+            <a:schemeClr val="accent1"/>
+          </a:fillRef>
+          <a:effectRef idx="0">
+            <a:schemeClr val="accent1"/>
+          </a:effectRef>
+          <a:fontRef idx="minor">
+            <a:schemeClr val="lt1"/>
+          </a:fontRef>
+        </p:style>
+        <p:txBody>
+          <a:bodyPr rtlCol="0" anchor="ctr"/>
+          <a:lstStyle/>
+          <a:p>
+            <a:pPr algn="ctr"/>
+            <a:endParaRPr lang="pt-BR"/>
+          </a:p>
+        </p:txBody>
+      </p:sp>
+      <p:sp>
+        <p:nvSpPr>
+          <p:cNvPr id="60" name="Retângulo: Cantos Arredondados 59">
+            <a:extLst>
+              <a:ext uri="{FF2B5EF4-FFF2-40B4-BE49-F238E27FC236}">
+                <a16:creationId xmlns:a16="http://schemas.microsoft.com/office/drawing/2014/main" id="{C764B8C9-275C-508E-C3B4-92633A7852B7}"/>
+              </a:ext>
+            </a:extLst>
+          </p:cNvPr>
+          <p:cNvSpPr/>
+          <p:nvPr/>
+        </p:nvSpPr>
+        <p:spPr>
+          <a:xfrm>
+            <a:off x="7307580" y="2145719"/>
+            <a:ext cx="4594858" cy="2068919"/>
+          </a:xfrm>
+          <a:prstGeom prst="roundRect">
+            <a:avLst>
+              <a:gd name="adj" fmla="val 15646"/>
+            </a:avLst>
+          </a:prstGeom>
+          <a:solidFill>
+            <a:schemeClr val="bg1"/>
+          </a:solidFill>
+          <a:ln>
+            <a:noFill/>
+          </a:ln>
+        </p:spPr>
+        <p:style>
+          <a:lnRef idx="2">
+            <a:schemeClr val="accent1">
+              <a:shade val="15000"/>
+            </a:schemeClr>
+          </a:lnRef>
+          <a:fillRef idx="1">
+            <a:schemeClr val="accent1"/>
+          </a:fillRef>
+          <a:effectRef idx="0">
+            <a:schemeClr val="accent1"/>
+          </a:effectRef>
+          <a:fontRef idx="minor">
+            <a:schemeClr val="lt1"/>
+          </a:fontRef>
+        </p:style>
+        <p:txBody>
+          <a:bodyPr rtlCol="0" anchor="ctr"/>
+          <a:lstStyle/>
+          <a:p>
+            <a:pPr algn="ctr"/>
+            <a:endParaRPr lang="pt-BR"/>
+          </a:p>
+        </p:txBody>
+      </p:sp>
+      <p:sp>
+        <p:nvSpPr>
+          <p:cNvPr id="63" name="Retângulo: Cantos Arredondados 62">
+            <a:extLst>
+              <a:ext uri="{FF2B5EF4-FFF2-40B4-BE49-F238E27FC236}">
+                <a16:creationId xmlns:a16="http://schemas.microsoft.com/office/drawing/2014/main" id="{7C0E8F25-8340-27E5-9DD6-6229B55CE36F}"/>
+              </a:ext>
+            </a:extLst>
+          </p:cNvPr>
+          <p:cNvSpPr/>
+          <p:nvPr/>
+        </p:nvSpPr>
+        <p:spPr>
+          <a:xfrm>
+            <a:off x="2415539" y="4501081"/>
+            <a:ext cx="4594858" cy="2068919"/>
+          </a:xfrm>
+          <a:prstGeom prst="roundRect">
+            <a:avLst>
+              <a:gd name="adj" fmla="val 15646"/>
+            </a:avLst>
+          </a:prstGeom>
+          <a:solidFill>
+            <a:schemeClr val="bg1"/>
+          </a:solidFill>
+          <a:ln>
+            <a:noFill/>
+          </a:ln>
+        </p:spPr>
+        <p:style>
+          <a:lnRef idx="2">
+            <a:schemeClr val="accent1">
+              <a:shade val="15000"/>
+            </a:schemeClr>
+          </a:lnRef>
+          <a:fillRef idx="1">
+            <a:schemeClr val="accent1"/>
+          </a:fillRef>
+          <a:effectRef idx="0">
+            <a:schemeClr val="accent1"/>
+          </a:effectRef>
+          <a:fontRef idx="minor">
+            <a:schemeClr val="lt1"/>
+          </a:fontRef>
+        </p:style>
+        <p:txBody>
+          <a:bodyPr rtlCol="0" anchor="ctr"/>
+          <a:lstStyle/>
+          <a:p>
+            <a:pPr algn="ctr"/>
+            <a:endParaRPr lang="pt-BR"/>
+          </a:p>
+        </p:txBody>
+      </p:sp>
+      <p:sp>
+        <p:nvSpPr>
+          <p:cNvPr id="64" name="Retângulo: Cantos Arredondados 63">
+            <a:extLst>
+              <a:ext uri="{FF2B5EF4-FFF2-40B4-BE49-F238E27FC236}">
+                <a16:creationId xmlns:a16="http://schemas.microsoft.com/office/drawing/2014/main" id="{D2EAB024-F135-827B-E287-24CE883285E6}"/>
+              </a:ext>
+            </a:extLst>
+          </p:cNvPr>
+          <p:cNvSpPr/>
+          <p:nvPr/>
+        </p:nvSpPr>
+        <p:spPr>
+          <a:xfrm>
+            <a:off x="7303768" y="4501077"/>
+            <a:ext cx="4594858" cy="2068919"/>
+          </a:xfrm>
+          <a:prstGeom prst="roundRect">
+            <a:avLst>
+              <a:gd name="adj" fmla="val 15646"/>
+            </a:avLst>
+          </a:prstGeom>
+          <a:solidFill>
+            <a:schemeClr val="bg1"/>
+          </a:solidFill>
+          <a:ln>
+            <a:noFill/>
+          </a:ln>
+        </p:spPr>
+        <p:style>
+          <a:lnRef idx="2">
+            <a:schemeClr val="accent1">
+              <a:shade val="15000"/>
+            </a:schemeClr>
+          </a:lnRef>
+          <a:fillRef idx="1">
+            <a:schemeClr val="accent1"/>
+          </a:fillRef>
+          <a:effectRef idx="0">
+            <a:schemeClr val="accent1"/>
+          </a:effectRef>
+          <a:fontRef idx="minor">
+            <a:schemeClr val="lt1"/>
+          </a:fontRef>
+        </p:style>
+        <p:txBody>
+          <a:bodyPr rtlCol="0" anchor="ctr"/>
+          <a:lstStyle/>
+          <a:p>
+            <a:pPr algn="ctr"/>
+            <a:endParaRPr lang="pt-BR"/>
+          </a:p>
+        </p:txBody>
+      </p:sp>
+      <p:pic>
+        <p:nvPicPr>
+          <p:cNvPr id="4" name="Imagem 3">
+            <a:extLst>
+              <a:ext uri="{FF2B5EF4-FFF2-40B4-BE49-F238E27FC236}">
+                <a16:creationId xmlns:a16="http://schemas.microsoft.com/office/drawing/2014/main" id="{C1FC4FFF-0D1E-441E-9F6E-E624E7076BA5}"/>
+              </a:ext>
+            </a:extLst>
+          </p:cNvPr>
+          <p:cNvPicPr>
+            <a:picLocks noChangeAspect="1"/>
+          </p:cNvPicPr>
+          <p:nvPr/>
+        </p:nvPicPr>
+        <p:blipFill>
+          <a:blip r:embed="rId2">
+            <a:extLst>
+              <a:ext uri="{28A0092B-C50C-407E-A947-70E740481C1C}">
+                <a14:useLocalDpi xmlns:a14="http://schemas.microsoft.com/office/drawing/2010/main" val="0"/>
+              </a:ext>
+            </a:extLst>
+          </a:blip>
+          <a:stretch>
+            <a:fillRect/>
+          </a:stretch>
+        </p:blipFill>
+        <p:spPr>
+          <a:xfrm>
+            <a:off x="-33337" y="-208514"/>
+            <a:ext cx="2145028" cy="2145028"/>
+          </a:xfrm>
+          <a:prstGeom prst="rect">
+            <a:avLst/>
+          </a:prstGeom>
+        </p:spPr>
+      </p:pic>
+      <p:pic>
+        <p:nvPicPr>
+          <p:cNvPr id="6" name="Gráfico 5" descr="Gráfico de barras com tendência ascendente com preenchimento sólido">
+            <a:extLst>
+              <a:ext uri="{FF2B5EF4-FFF2-40B4-BE49-F238E27FC236}">
+                <a16:creationId xmlns:a16="http://schemas.microsoft.com/office/drawing/2014/main" id="{D065785C-5A64-4B2D-8708-1D78BE447ED9}"/>
+              </a:ext>
+            </a:extLst>
+          </p:cNvPr>
+          <p:cNvPicPr>
+            <a:picLocks noChangeAspect="1"/>
+          </p:cNvPicPr>
+          <p:nvPr/>
+        </p:nvPicPr>
+        <p:blipFill>
+          <a:blip r:embed="rId3">
+            <a:extLst>
+              <a:ext uri="{28A0092B-C50C-407E-A947-70E740481C1C}">
+                <a14:useLocalDpi xmlns:a14="http://schemas.microsoft.com/office/drawing/2010/main" val="0"/>
+              </a:ext>
+              <a:ext uri="{96DAC541-7B7A-43D3-8B79-37D633B846F1}">
+                <asvg:svgBlip xmlns:asvg="http://schemas.microsoft.com/office/drawing/2016/SVG/main" r:embed="rId4"/>
+              </a:ext>
+            </a:extLst>
+          </a:blip>
+          <a:stretch>
+            <a:fillRect/>
+          </a:stretch>
+        </p:blipFill>
+        <p:spPr>
+          <a:xfrm>
+            <a:off x="7350482" y="1096878"/>
+            <a:ext cx="527963" cy="527963"/>
+          </a:xfrm>
+          <a:prstGeom prst="rect">
+            <a:avLst/>
+          </a:prstGeom>
+        </p:spPr>
+      </p:pic>
+      <p:pic>
+        <p:nvPicPr>
+          <p:cNvPr id="8" name="Gráfico 7" descr="Dinheiro com preenchimento sólido">
+            <a:extLst>
+              <a:ext uri="{FF2B5EF4-FFF2-40B4-BE49-F238E27FC236}">
+                <a16:creationId xmlns:a16="http://schemas.microsoft.com/office/drawing/2014/main" id="{8DF0EDF3-61A7-41E4-9DFC-B295CA8D7A56}"/>
+              </a:ext>
+            </a:extLst>
+          </p:cNvPr>
+          <p:cNvPicPr>
+            <a:picLocks noChangeAspect="1"/>
+          </p:cNvPicPr>
+          <p:nvPr/>
+        </p:nvPicPr>
+        <p:blipFill>
+          <a:blip r:embed="rId5">
+            <a:extLst>
+              <a:ext uri="{28A0092B-C50C-407E-A947-70E740481C1C}">
+                <a14:useLocalDpi xmlns:a14="http://schemas.microsoft.com/office/drawing/2010/main" val="0"/>
+              </a:ext>
+              <a:ext uri="{96DAC541-7B7A-43D3-8B79-37D633B846F1}">
+                <asvg:svgBlip xmlns:asvg="http://schemas.microsoft.com/office/drawing/2016/SVG/main" r:embed="rId6"/>
+              </a:ext>
+            </a:extLst>
+          </a:blip>
+          <a:stretch>
+            <a:fillRect/>
+          </a:stretch>
+        </p:blipFill>
+        <p:spPr>
+          <a:xfrm>
+            <a:off x="4968142" y="1096878"/>
+            <a:ext cx="527963" cy="527963"/>
+          </a:xfrm>
+          <a:prstGeom prst="rect">
+            <a:avLst/>
+          </a:prstGeom>
+        </p:spPr>
+      </p:pic>
+      <p:pic>
+        <p:nvPicPr>
+          <p:cNvPr id="10" name="Gráfico 9" descr="Gráfico de barras com preenchimento sólido">
+            <a:extLst>
+              <a:ext uri="{FF2B5EF4-FFF2-40B4-BE49-F238E27FC236}">
+                <a16:creationId xmlns:a16="http://schemas.microsoft.com/office/drawing/2014/main" id="{5B10A259-79AB-4216-B2C6-4756B2F87629}"/>
+              </a:ext>
+            </a:extLst>
+          </p:cNvPr>
+          <p:cNvPicPr>
+            <a:picLocks noChangeAspect="1"/>
+          </p:cNvPicPr>
+          <p:nvPr/>
+        </p:nvPicPr>
+        <p:blipFill>
+          <a:blip r:embed="rId7">
+            <a:extLst>
+              <a:ext uri="{28A0092B-C50C-407E-A947-70E740481C1C}">
+                <a14:useLocalDpi xmlns:a14="http://schemas.microsoft.com/office/drawing/2010/main" val="0"/>
+              </a:ext>
+              <a:ext uri="{96DAC541-7B7A-43D3-8B79-37D633B846F1}">
+                <asvg:svgBlip xmlns:asvg="http://schemas.microsoft.com/office/drawing/2016/SVG/main" r:embed="rId8"/>
+              </a:ext>
+            </a:extLst>
+          </a:blip>
+          <a:stretch>
+            <a:fillRect/>
+          </a:stretch>
+        </p:blipFill>
+        <p:spPr>
+          <a:xfrm>
+            <a:off x="2451593" y="1076869"/>
+            <a:ext cx="567980" cy="567980"/>
+          </a:xfrm>
+          <a:prstGeom prst="rect">
+            <a:avLst/>
+          </a:prstGeom>
+        </p:spPr>
+      </p:pic>
+      <p:pic>
+        <p:nvPicPr>
+          <p:cNvPr id="12" name="Gráfico 11" descr="Moedas com preenchimento sólido">
+            <a:extLst>
+              <a:ext uri="{FF2B5EF4-FFF2-40B4-BE49-F238E27FC236}">
+                <a16:creationId xmlns:a16="http://schemas.microsoft.com/office/drawing/2014/main" id="{D3D60B13-33AB-4826-9EE4-4B22D16E956F}"/>
+              </a:ext>
+            </a:extLst>
+          </p:cNvPr>
+          <p:cNvPicPr>
+            <a:picLocks noChangeAspect="1"/>
+          </p:cNvPicPr>
+          <p:nvPr/>
+        </p:nvPicPr>
+        <p:blipFill>
+          <a:blip r:embed="rId9">
+            <a:extLst>
+              <a:ext uri="{28A0092B-C50C-407E-A947-70E740481C1C}">
+                <a14:useLocalDpi xmlns:a14="http://schemas.microsoft.com/office/drawing/2010/main" val="0"/>
+              </a:ext>
+              <a:ext uri="{96DAC541-7B7A-43D3-8B79-37D633B846F1}">
+                <asvg:svgBlip xmlns:asvg="http://schemas.microsoft.com/office/drawing/2016/SVG/main" r:embed="rId10"/>
+              </a:ext>
+            </a:extLst>
+          </a:blip>
+          <a:stretch>
+            <a:fillRect/>
+          </a:stretch>
+        </p:blipFill>
+        <p:spPr>
+          <a:xfrm>
+            <a:off x="9809659" y="1138097"/>
+            <a:ext cx="527963" cy="527963"/>
+          </a:xfrm>
+          <a:prstGeom prst="rect">
+            <a:avLst/>
+          </a:prstGeom>
+        </p:spPr>
+      </p:pic>
+      <p:pic>
+        <p:nvPicPr>
+          <p:cNvPr id="5" name="Imagem 4">
+            <a:extLst>
+              <a:ext uri="{FF2B5EF4-FFF2-40B4-BE49-F238E27FC236}">
+                <a16:creationId xmlns:a16="http://schemas.microsoft.com/office/drawing/2014/main" id="{1E6A63C2-6E24-4498-9F0E-88478CBF1179}"/>
+              </a:ext>
+            </a:extLst>
+          </p:cNvPr>
+          <p:cNvPicPr>
+            <a:picLocks noChangeAspect="1"/>
+          </p:cNvPicPr>
+          <p:nvPr/>
+        </p:nvPicPr>
+        <p:blipFill>
+          <a:blip r:embed="rId11">
+            <a:extLst>
+              <a:ext uri="{28A0092B-C50C-407E-A947-70E740481C1C}">
+                <a14:useLocalDpi xmlns:a14="http://schemas.microsoft.com/office/drawing/2010/main" val="0"/>
+              </a:ext>
+            </a:extLst>
+          </a:blip>
+          <a:stretch>
+            <a:fillRect/>
+          </a:stretch>
+        </p:blipFill>
+        <p:spPr>
+          <a:xfrm>
+            <a:off x="-675" y="-208515"/>
+            <a:ext cx="12192675" cy="7046990"/>
+          </a:xfrm>
+          <a:prstGeom prst="rect">
+            <a:avLst/>
+          </a:prstGeom>
+        </p:spPr>
+      </p:pic>
+      <p:pic>
+        <p:nvPicPr>
+          <p:cNvPr id="9" name="Gráfico 8" descr="Voltar com preenchimento sólido">
+            <a:extLst>
+              <a:ext uri="{FF2B5EF4-FFF2-40B4-BE49-F238E27FC236}">
+                <a16:creationId xmlns:a16="http://schemas.microsoft.com/office/drawing/2014/main" id="{235B6265-B86B-4DC1-92C3-F81DE3056730}"/>
+              </a:ext>
+            </a:extLst>
+          </p:cNvPr>
+          <p:cNvPicPr>
+            <a:picLocks noChangeAspect="1"/>
+          </p:cNvPicPr>
+          <p:nvPr/>
+        </p:nvPicPr>
+        <p:blipFill>
+          <a:blip r:embed="rId12">
+            <a:extLst>
+              <a:ext uri="{28A0092B-C50C-407E-A947-70E740481C1C}">
+                <a14:useLocalDpi xmlns:a14="http://schemas.microsoft.com/office/drawing/2010/main" val="0"/>
+              </a:ext>
+              <a:ext uri="{96DAC541-7B7A-43D3-8B79-37D633B846F1}">
+                <asvg:svgBlip xmlns:asvg="http://schemas.microsoft.com/office/drawing/2016/SVG/main" r:embed="rId13"/>
+              </a:ext>
+            </a:extLst>
+          </a:blip>
+          <a:stretch>
+            <a:fillRect/>
+          </a:stretch>
+        </p:blipFill>
+        <p:spPr>
+          <a:xfrm>
+            <a:off x="11524467" y="287999"/>
+            <a:ext cx="288001" cy="288001"/>
+          </a:xfrm>
+          <a:prstGeom prst="rect">
+            <a:avLst/>
+          </a:prstGeom>
+        </p:spPr>
+      </p:pic>
+    </p:spTree>
+    <p:extLst>
+      <p:ext uri="{BB962C8B-B14F-4D97-AF65-F5344CB8AC3E}">
+        <p14:creationId xmlns:p14="http://schemas.microsoft.com/office/powerpoint/2010/main" val="2499936511"/>
+      </p:ext>
+    </p:extLst>
+  </p:cSld>
+  <p:clrMapOvr>
+    <a:masterClrMapping/>
+  </p:clrMapOvr>
+</p:sld>
+</file>
+
+<file path=ppt/slides/slide5.xml><?xml version="1.0" encoding="utf-8"?>
+<p:sld xmlns:a="http://schemas.openxmlformats.org/drawingml/2006/main" xmlns:r="http://schemas.openxmlformats.org/officeDocument/2006/relationships" xmlns:p="http://schemas.openxmlformats.org/presentationml/2006/main">
+  <p:cSld>
+    <p:spTree>
+      <p:nvGrpSpPr>
+        <p:cNvPr id="1" name=""/>
+        <p:cNvGrpSpPr/>
+        <p:nvPr/>
+      </p:nvGrpSpPr>
+      <p:grpSpPr>
+        <a:xfrm>
+          <a:off x="0" y="0"/>
+          <a:ext cx="0" cy="0"/>
+          <a:chOff x="0" y="0"/>
+          <a:chExt cx="0" cy="0"/>
+        </a:xfrm>
+      </p:grpSpPr>
+      <p:sp>
+        <p:nvSpPr>
+          <p:cNvPr id="25" name="Retângulo 24">
+            <a:extLst>
+              <a:ext uri="{FF2B5EF4-FFF2-40B4-BE49-F238E27FC236}">
+                <a16:creationId xmlns:a16="http://schemas.microsoft.com/office/drawing/2014/main" id="{2451BEA7-3C3D-59AE-5D6D-980D159B7C5C}"/>
+              </a:ext>
+            </a:extLst>
+          </p:cNvPr>
+          <p:cNvSpPr/>
+          <p:nvPr/>
+        </p:nvSpPr>
+        <p:spPr>
+          <a:xfrm>
+            <a:off x="0" y="0"/>
+            <a:ext cx="12192000" cy="6858000"/>
+          </a:xfrm>
+          <a:prstGeom prst="rect">
+            <a:avLst/>
+          </a:prstGeom>
+          <a:solidFill>
+            <a:srgbClr val="F3C911"/>
+          </a:solidFill>
+          <a:ln>
+            <a:noFill/>
+          </a:ln>
+        </p:spPr>
+        <p:style>
+          <a:lnRef idx="2">
+            <a:schemeClr val="accent1">
+              <a:shade val="15000"/>
+            </a:schemeClr>
+          </a:lnRef>
+          <a:fillRef idx="1">
+            <a:schemeClr val="accent1"/>
+          </a:fillRef>
+          <a:effectRef idx="0">
+            <a:schemeClr val="accent1"/>
+          </a:effectRef>
+          <a:fontRef idx="minor">
+            <a:schemeClr val="lt1"/>
+          </a:fontRef>
+        </p:style>
+        <p:txBody>
+          <a:bodyPr rtlCol="0" anchor="ctr"/>
+          <a:lstStyle/>
+          <a:p>
+            <a:pPr algn="ctr"/>
+            <a:endParaRPr lang="pt-BR"/>
+          </a:p>
+        </p:txBody>
+      </p:sp>
+      <p:sp>
+        <p:nvSpPr>
+          <p:cNvPr id="26" name="Retângulo: Cantos Superiores Arredondados 25">
+            <a:extLst>
+              <a:ext uri="{FF2B5EF4-FFF2-40B4-BE49-F238E27FC236}">
+                <a16:creationId xmlns:a16="http://schemas.microsoft.com/office/drawing/2014/main" id="{63ACE2F9-DB39-3539-DF96-078203D451E8}"/>
+              </a:ext>
+            </a:extLst>
+          </p:cNvPr>
+          <p:cNvSpPr/>
+          <p:nvPr/>
+        </p:nvSpPr>
+        <p:spPr>
+          <a:xfrm rot="16200000">
+            <a:off x="3726180" y="-1607820"/>
+            <a:ext cx="6858000" cy="10073640"/>
+          </a:xfrm>
+          <a:prstGeom prst="round2SameRect">
+            <a:avLst>
+              <a:gd name="adj1" fmla="val 4371"/>
+              <a:gd name="adj2" fmla="val 0"/>
+            </a:avLst>
+          </a:prstGeom>
+          <a:solidFill>
+            <a:srgbClr val="C4C9CB"/>
+          </a:solidFill>
+          <a:ln>
+            <a:noFill/>
+          </a:ln>
+        </p:spPr>
+        <p:style>
+          <a:lnRef idx="2">
+            <a:schemeClr val="accent1">
+              <a:shade val="15000"/>
+            </a:schemeClr>
+          </a:lnRef>
+          <a:fillRef idx="1">
+            <a:schemeClr val="accent1"/>
+          </a:fillRef>
+          <a:effectRef idx="0">
+            <a:schemeClr val="accent1"/>
+          </a:effectRef>
+          <a:fontRef idx="minor">
+            <a:schemeClr val="lt1"/>
+          </a:fontRef>
+        </p:style>
+        <p:txBody>
+          <a:bodyPr rtlCol="0" anchor="ctr"/>
+          <a:lstStyle/>
+          <a:p>
+            <a:pPr algn="ctr"/>
+            <a:endParaRPr lang="pt-BR"/>
+          </a:p>
+        </p:txBody>
+      </p:sp>
+      <p:sp>
+        <p:nvSpPr>
+          <p:cNvPr id="32" name="Retângulo 31">
+            <a:extLst>
+              <a:ext uri="{FF2B5EF4-FFF2-40B4-BE49-F238E27FC236}">
+                <a16:creationId xmlns:a16="http://schemas.microsoft.com/office/drawing/2014/main" id="{272516B4-A5C0-8EC9-8FA5-2C30A0423BAC}"/>
+              </a:ext>
+            </a:extLst>
+          </p:cNvPr>
+          <p:cNvSpPr/>
+          <p:nvPr/>
+        </p:nvSpPr>
+        <p:spPr>
+          <a:xfrm rot="5400000">
+            <a:off x="7011179" y="-4315259"/>
+            <a:ext cx="288000" cy="9494518"/>
+          </a:xfrm>
+          <a:prstGeom prst="rect">
+            <a:avLst/>
+          </a:prstGeom>
+          <a:solidFill>
+            <a:srgbClr val="F3C911"/>
+          </a:solidFill>
+          <a:ln>
+            <a:noFill/>
+          </a:ln>
+        </p:spPr>
+        <p:style>
+          <a:lnRef idx="2">
+            <a:schemeClr val="accent1">
+              <a:shade val="15000"/>
+            </a:schemeClr>
+          </a:lnRef>
+          <a:fillRef idx="1">
+            <a:schemeClr val="accent1"/>
+          </a:fillRef>
+          <a:effectRef idx="0">
+            <a:schemeClr val="accent1"/>
+          </a:effectRef>
+          <a:fontRef idx="minor">
+            <a:schemeClr val="lt1"/>
+          </a:fontRef>
+        </p:style>
+        <p:txBody>
+          <a:bodyPr rtlCol="0" anchor="ctr"/>
+          <a:lstStyle/>
+          <a:p>
+            <a:pPr algn="ctr"/>
+            <a:endParaRPr lang="pt-BR"/>
+          </a:p>
+        </p:txBody>
+      </p:sp>
+      <p:sp>
+        <p:nvSpPr>
+          <p:cNvPr id="59" name="Retângulo: Cantos Arredondados 58">
+            <a:extLst>
+              <a:ext uri="{FF2B5EF4-FFF2-40B4-BE49-F238E27FC236}">
+                <a16:creationId xmlns:a16="http://schemas.microsoft.com/office/drawing/2014/main" id="{C36AB2CF-EAD5-61E8-1ED6-B40981265880}"/>
+              </a:ext>
+            </a:extLst>
+          </p:cNvPr>
+          <p:cNvSpPr/>
+          <p:nvPr/>
+        </p:nvSpPr>
+        <p:spPr>
+          <a:xfrm>
+            <a:off x="2411730" y="1504859"/>
+            <a:ext cx="4594858" cy="2068919"/>
+          </a:xfrm>
+          <a:prstGeom prst="roundRect">
+            <a:avLst>
+              <a:gd name="adj" fmla="val 15646"/>
+            </a:avLst>
+          </a:prstGeom>
+          <a:solidFill>
+            <a:schemeClr val="bg1"/>
+          </a:solidFill>
+          <a:ln>
+            <a:noFill/>
+          </a:ln>
+        </p:spPr>
+        <p:style>
+          <a:lnRef idx="2">
+            <a:schemeClr val="accent1">
+              <a:shade val="15000"/>
+            </a:schemeClr>
+          </a:lnRef>
+          <a:fillRef idx="1">
+            <a:schemeClr val="accent1"/>
+          </a:fillRef>
+          <a:effectRef idx="0">
+            <a:schemeClr val="accent1"/>
+          </a:effectRef>
+          <a:fontRef idx="minor">
+            <a:schemeClr val="lt1"/>
+          </a:fontRef>
+        </p:style>
+        <p:txBody>
+          <a:bodyPr rtlCol="0" anchor="ctr"/>
+          <a:lstStyle/>
+          <a:p>
+            <a:pPr algn="ctr"/>
+            <a:endParaRPr lang="pt-BR"/>
+          </a:p>
+        </p:txBody>
+      </p:sp>
+      <p:sp>
+        <p:nvSpPr>
+          <p:cNvPr id="60" name="Retângulo: Cantos Arredondados 59">
+            <a:extLst>
+              <a:ext uri="{FF2B5EF4-FFF2-40B4-BE49-F238E27FC236}">
+                <a16:creationId xmlns:a16="http://schemas.microsoft.com/office/drawing/2014/main" id="{C764B8C9-275C-508E-C3B4-92633A7852B7}"/>
+              </a:ext>
+            </a:extLst>
+          </p:cNvPr>
+          <p:cNvSpPr/>
+          <p:nvPr/>
+        </p:nvSpPr>
+        <p:spPr>
+          <a:xfrm>
+            <a:off x="7307580" y="1504859"/>
+            <a:ext cx="4594858" cy="2068919"/>
+          </a:xfrm>
+          <a:prstGeom prst="roundRect">
+            <a:avLst>
+              <a:gd name="adj" fmla="val 15646"/>
+            </a:avLst>
+          </a:prstGeom>
+          <a:solidFill>
+            <a:schemeClr val="bg1"/>
+          </a:solidFill>
+          <a:ln>
+            <a:noFill/>
+          </a:ln>
+        </p:spPr>
+        <p:style>
+          <a:lnRef idx="2">
+            <a:schemeClr val="accent1">
+              <a:shade val="15000"/>
+            </a:schemeClr>
+          </a:lnRef>
+          <a:fillRef idx="1">
+            <a:schemeClr val="accent1"/>
+          </a:fillRef>
+          <a:effectRef idx="0">
+            <a:schemeClr val="accent1"/>
+          </a:effectRef>
+          <a:fontRef idx="minor">
+            <a:schemeClr val="lt1"/>
+          </a:fontRef>
+        </p:style>
+        <p:txBody>
+          <a:bodyPr rtlCol="0" anchor="ctr"/>
+          <a:lstStyle/>
+          <a:p>
+            <a:pPr algn="ctr"/>
+            <a:endParaRPr lang="pt-BR"/>
+          </a:p>
+        </p:txBody>
+      </p:sp>
+      <p:sp>
+        <p:nvSpPr>
+          <p:cNvPr id="63" name="Retângulo: Cantos Arredondados 62">
+            <a:extLst>
+              <a:ext uri="{FF2B5EF4-FFF2-40B4-BE49-F238E27FC236}">
+                <a16:creationId xmlns:a16="http://schemas.microsoft.com/office/drawing/2014/main" id="{7C0E8F25-8340-27E5-9DD6-6229B55CE36F}"/>
+              </a:ext>
+            </a:extLst>
+          </p:cNvPr>
+          <p:cNvSpPr/>
+          <p:nvPr/>
+        </p:nvSpPr>
+        <p:spPr>
+          <a:xfrm>
+            <a:off x="2415539" y="3860221"/>
+            <a:ext cx="4594858" cy="2068919"/>
+          </a:xfrm>
+          <a:prstGeom prst="roundRect">
+            <a:avLst>
+              <a:gd name="adj" fmla="val 15646"/>
+            </a:avLst>
+          </a:prstGeom>
+          <a:solidFill>
+            <a:schemeClr val="bg1"/>
+          </a:solidFill>
+          <a:ln>
+            <a:noFill/>
+          </a:ln>
+        </p:spPr>
+        <p:style>
+          <a:lnRef idx="2">
+            <a:schemeClr val="accent1">
+              <a:shade val="15000"/>
+            </a:schemeClr>
+          </a:lnRef>
+          <a:fillRef idx="1">
+            <a:schemeClr val="accent1"/>
+          </a:fillRef>
+          <a:effectRef idx="0">
+            <a:schemeClr val="accent1"/>
+          </a:effectRef>
+          <a:fontRef idx="minor">
+            <a:schemeClr val="lt1"/>
+          </a:fontRef>
+        </p:style>
+        <p:txBody>
+          <a:bodyPr rtlCol="0" anchor="ctr"/>
+          <a:lstStyle/>
+          <a:p>
+            <a:pPr algn="ctr"/>
+            <a:endParaRPr lang="pt-BR"/>
+          </a:p>
+        </p:txBody>
+      </p:sp>
+      <p:sp>
+        <p:nvSpPr>
+          <p:cNvPr id="64" name="Retângulo: Cantos Arredondados 63">
+            <a:extLst>
+              <a:ext uri="{FF2B5EF4-FFF2-40B4-BE49-F238E27FC236}">
+                <a16:creationId xmlns:a16="http://schemas.microsoft.com/office/drawing/2014/main" id="{D2EAB024-F135-827B-E287-24CE883285E6}"/>
+              </a:ext>
+            </a:extLst>
+          </p:cNvPr>
+          <p:cNvSpPr/>
+          <p:nvPr/>
+        </p:nvSpPr>
+        <p:spPr>
+          <a:xfrm>
+            <a:off x="7303768" y="3860217"/>
+            <a:ext cx="4594858" cy="2068919"/>
+          </a:xfrm>
+          <a:prstGeom prst="roundRect">
+            <a:avLst>
+              <a:gd name="adj" fmla="val 15646"/>
+            </a:avLst>
+          </a:prstGeom>
+          <a:solidFill>
+            <a:schemeClr val="bg1"/>
+          </a:solidFill>
+          <a:ln>
+            <a:noFill/>
+          </a:ln>
+        </p:spPr>
+        <p:style>
+          <a:lnRef idx="2">
+            <a:schemeClr val="accent1">
+              <a:shade val="15000"/>
+            </a:schemeClr>
+          </a:lnRef>
+          <a:fillRef idx="1">
+            <a:schemeClr val="accent1"/>
+          </a:fillRef>
+          <a:effectRef idx="0">
+            <a:schemeClr val="accent1"/>
+          </a:effectRef>
+          <a:fontRef idx="minor">
+            <a:schemeClr val="lt1"/>
+          </a:fontRef>
+        </p:style>
+        <p:txBody>
+          <a:bodyPr rtlCol="0" anchor="ctr"/>
+          <a:lstStyle/>
+          <a:p>
+            <a:pPr algn="ctr"/>
+            <a:endParaRPr lang="pt-BR"/>
+          </a:p>
+        </p:txBody>
+      </p:sp>
+      <p:pic>
+        <p:nvPicPr>
+          <p:cNvPr id="4" name="Imagem 3">
+            <a:extLst>
+              <a:ext uri="{FF2B5EF4-FFF2-40B4-BE49-F238E27FC236}">
+                <a16:creationId xmlns:a16="http://schemas.microsoft.com/office/drawing/2014/main" id="{C1FC4FFF-0D1E-441E-9F6E-E624E7076BA5}"/>
+              </a:ext>
+            </a:extLst>
+          </p:cNvPr>
+          <p:cNvPicPr>
+            <a:picLocks noChangeAspect="1"/>
+          </p:cNvPicPr>
+          <p:nvPr/>
+        </p:nvPicPr>
+        <p:blipFill>
+          <a:blip r:embed="rId2">
+            <a:extLst>
+              <a:ext uri="{28A0092B-C50C-407E-A947-70E740481C1C}">
+                <a14:useLocalDpi xmlns:a14="http://schemas.microsoft.com/office/drawing/2010/main" val="0"/>
+              </a:ext>
+            </a:extLst>
+          </a:blip>
+          <a:stretch>
+            <a:fillRect/>
+          </a:stretch>
+        </p:blipFill>
+        <p:spPr>
+          <a:xfrm>
+            <a:off x="-33337" y="-208514"/>
+            <a:ext cx="2145028" cy="2145028"/>
+          </a:xfrm>
+          <a:prstGeom prst="rect">
+            <a:avLst/>
+          </a:prstGeom>
+        </p:spPr>
+      </p:pic>
+      <p:pic>
+        <p:nvPicPr>
+          <p:cNvPr id="3" name="Imagem 2">
+            <a:extLst>
+              <a:ext uri="{FF2B5EF4-FFF2-40B4-BE49-F238E27FC236}">
+                <a16:creationId xmlns:a16="http://schemas.microsoft.com/office/drawing/2014/main" id="{58A02A0F-08CF-4671-9D55-7792F9A27538}"/>
+              </a:ext>
+            </a:extLst>
+          </p:cNvPr>
+          <p:cNvPicPr>
+            <a:picLocks noChangeAspect="1"/>
+          </p:cNvPicPr>
+          <p:nvPr/>
+        </p:nvPicPr>
+        <p:blipFill>
+          <a:blip r:embed="rId3">
+            <a:extLst>
+              <a:ext uri="{28A0092B-C50C-407E-A947-70E740481C1C}">
+                <a14:useLocalDpi xmlns:a14="http://schemas.microsoft.com/office/drawing/2010/main" val="0"/>
+              </a:ext>
+            </a:extLst>
+          </a:blip>
+          <a:stretch>
+            <a:fillRect/>
+          </a:stretch>
+        </p:blipFill>
+        <p:spPr>
+          <a:xfrm>
+            <a:off x="36753" y="-208514"/>
+            <a:ext cx="12155247" cy="7025358"/>
+          </a:xfrm>
+          <a:prstGeom prst="rect">
+            <a:avLst/>
+          </a:prstGeom>
+        </p:spPr>
+      </p:pic>
+      <p:pic>
+        <p:nvPicPr>
+          <p:cNvPr id="11" name="Gráfico 10" descr="Voltar com preenchimento sólido">
+            <a:extLst>
+              <a:ext uri="{FF2B5EF4-FFF2-40B4-BE49-F238E27FC236}">
+                <a16:creationId xmlns:a16="http://schemas.microsoft.com/office/drawing/2014/main" id="{12D8870F-FA08-40CE-8701-C58E7867D211}"/>
+              </a:ext>
+            </a:extLst>
+          </p:cNvPr>
+          <p:cNvPicPr>
+            <a:picLocks noChangeAspect="1"/>
+          </p:cNvPicPr>
+          <p:nvPr/>
+        </p:nvPicPr>
+        <p:blipFill>
+          <a:blip r:embed="rId4">
+            <a:extLst>
+              <a:ext uri="{28A0092B-C50C-407E-A947-70E740481C1C}">
+                <a14:useLocalDpi xmlns:a14="http://schemas.microsoft.com/office/drawing/2010/main" val="0"/>
+              </a:ext>
+              <a:ext uri="{96DAC541-7B7A-43D3-8B79-37D633B846F1}">
+                <asvg:svgBlip xmlns:asvg="http://schemas.microsoft.com/office/drawing/2016/SVG/main" r:embed="rId5"/>
+              </a:ext>
+            </a:extLst>
+          </a:blip>
+          <a:stretch>
+            <a:fillRect/>
+          </a:stretch>
+        </p:blipFill>
+        <p:spPr>
+          <a:xfrm>
+            <a:off x="11524467" y="287999"/>
+            <a:ext cx="288001" cy="288001"/>
+          </a:xfrm>
+          <a:prstGeom prst="rect">
+            <a:avLst/>
+          </a:prstGeom>
+        </p:spPr>
+      </p:pic>
+      <p:pic>
+        <p:nvPicPr>
+          <p:cNvPr id="5" name="Gráfico 4" descr="Início com preenchimento sólido">
+            <a:extLst>
+              <a:ext uri="{FF2B5EF4-FFF2-40B4-BE49-F238E27FC236}">
+                <a16:creationId xmlns:a16="http://schemas.microsoft.com/office/drawing/2014/main" id="{DFDCA4EC-04C2-47A3-A79F-6803B90314FD}"/>
+              </a:ext>
+            </a:extLst>
+          </p:cNvPr>
+          <p:cNvPicPr>
+            <a:picLocks noChangeAspect="1"/>
+          </p:cNvPicPr>
+          <p:nvPr/>
+        </p:nvPicPr>
+        <p:blipFill>
+          <a:blip r:embed="rId6">
+            <a:extLst>
+              <a:ext uri="{28A0092B-C50C-407E-A947-70E740481C1C}">
+                <a14:useLocalDpi xmlns:a14="http://schemas.microsoft.com/office/drawing/2010/main" val="0"/>
+              </a:ext>
+              <a:ext uri="{96DAC541-7B7A-43D3-8B79-37D633B846F1}">
+                <asvg:svgBlip xmlns:asvg="http://schemas.microsoft.com/office/drawing/2016/SVG/main" r:embed="rId7"/>
+              </a:ext>
+            </a:extLst>
+          </a:blip>
+          <a:stretch>
+            <a:fillRect/>
+          </a:stretch>
+        </p:blipFill>
+        <p:spPr>
+          <a:xfrm>
+            <a:off x="5951999" y="287999"/>
+            <a:ext cx="288001" cy="288001"/>
+          </a:xfrm>
+          <a:prstGeom prst="rect">
+            <a:avLst/>
+          </a:prstGeom>
+        </p:spPr>
+      </p:pic>
+    </p:spTree>
+    <p:extLst>
+      <p:ext uri="{BB962C8B-B14F-4D97-AF65-F5344CB8AC3E}">
+        <p14:creationId xmlns:p14="http://schemas.microsoft.com/office/powerpoint/2010/main" val="257077227"/>
       </p:ext>
     </p:extLst>
   </p:cSld>

</xml_diff>